<commit_message>
hapus contoh 2; tambahkan gambar contoh 1 ke slide
</commit_message>
<xml_diff>
--- a/Apa Itu Unit Testing.pptx
+++ b/Apa Itu Unit Testing.pptx
@@ -5,7 +5,7 @@
     <p:sldMasterId id="2147483672" r:id="rId1"/>
   </p:sldMasterIdLst>
   <p:notesMasterIdLst>
-    <p:notesMasterId r:id="rId16"/>
+    <p:notesMasterId r:id="rId18"/>
   </p:notesMasterIdLst>
   <p:sldIdLst>
     <p:sldId id="256" r:id="rId2"/>
@@ -20,16 +20,18 @@
     <p:sldId id="313" r:id="rId11"/>
     <p:sldId id="307" r:id="rId12"/>
     <p:sldId id="271" r:id="rId13"/>
-    <p:sldId id="309" r:id="rId14"/>
-    <p:sldId id="316" r:id="rId15"/>
+    <p:sldId id="317" r:id="rId14"/>
+    <p:sldId id="318" r:id="rId15"/>
+    <p:sldId id="319" r:id="rId16"/>
+    <p:sldId id="316" r:id="rId17"/>
   </p:sldIdLst>
   <p:sldSz cx="9144000" cy="5143500" type="screen16x9"/>
   <p:notesSz cx="6858000" cy="9144000"/>
   <p:embeddedFontLst>
     <p:embeddedFont>
       <p:font typeface="Fira Code" panose="020B0809050000020004" pitchFamily="49" charset="0"/>
-      <p:regular r:id="rId17"/>
-      <p:bold r:id="rId18"/>
+      <p:regular r:id="rId19"/>
+      <p:bold r:id="rId20"/>
     </p:embeddedFont>
   </p:embeddedFontLst>
   <p:defaultTextStyle>
@@ -1141,7 +1143,7 @@
   <p:cSld>
     <p:spTree>
       <p:nvGrpSpPr>
-        <p:cNvPr id="1" name="Shape 848"/>
+        <p:cNvPr id="1" name="Shape 496"/>
         <p:cNvGrpSpPr/>
         <p:nvPr/>
       </p:nvGrpSpPr>
@@ -1155,7 +1157,7 @@
       </p:grpSpPr>
       <p:sp>
         <p:nvSpPr>
-          <p:cNvPr id="849" name="Google Shape;849;ge7f9c668d6_0_1028:notes"/>
+          <p:cNvPr id="497" name="Google Shape;497;ge7f9c668d6_0_6:notes"/>
           <p:cNvSpPr>
             <a:spLocks noGrp="1" noRot="1" noChangeAspect="1"/>
           </p:cNvSpPr>
@@ -1196,6 +1198,115 @@
       </p:sp>
       <p:sp>
         <p:nvSpPr>
+          <p:cNvPr id="498" name="Google Shape;498;ge7f9c668d6_0_6:notes"/>
+          <p:cNvSpPr txBox="1">
+            <a:spLocks noGrp="1"/>
+          </p:cNvSpPr>
+          <p:nvPr>
+            <p:ph type="body" idx="1"/>
+          </p:nvPr>
+        </p:nvSpPr>
+        <p:spPr>
+          <a:xfrm>
+            <a:off x="685800" y="4343400"/>
+            <a:ext cx="5486400" cy="4114800"/>
+          </a:xfrm>
+          <a:prstGeom prst="rect">
+            <a:avLst/>
+          </a:prstGeom>
+        </p:spPr>
+        <p:txBody>
+          <a:bodyPr spcFirstLastPara="1" wrap="square" lIns="91425" tIns="91425" rIns="91425" bIns="91425" anchor="t" anchorCtr="0">
+            <a:noAutofit/>
+          </a:bodyPr>
+          <a:lstStyle/>
+          <a:p>
+            <a:pPr marL="0" lvl="0" indent="0" algn="l" rtl="0">
+              <a:spcBef>
+                <a:spcPts val="0"/>
+              </a:spcBef>
+              <a:spcAft>
+                <a:spcPts val="0"/>
+              </a:spcAft>
+              <a:buNone/>
+            </a:pPr>
+            <a:endParaRPr/>
+          </a:p>
+        </p:txBody>
+      </p:sp>
+    </p:spTree>
+    <p:extLst>
+      <p:ext uri="{BB962C8B-B14F-4D97-AF65-F5344CB8AC3E}">
+        <p14:creationId xmlns:p14="http://schemas.microsoft.com/office/powerpoint/2010/main" val="373255942"/>
+      </p:ext>
+    </p:extLst>
+  </p:cSld>
+  <p:clrMapOvr>
+    <a:masterClrMapping/>
+  </p:clrMapOvr>
+</p:notes>
+</file>
+
+<file path=ppt/notesSlides/notesSlide14.xml><?xml version="1.0" encoding="utf-8"?>
+<p:notes xmlns:a="http://schemas.openxmlformats.org/drawingml/2006/main" xmlns:r="http://schemas.openxmlformats.org/officeDocument/2006/relationships" xmlns:p="http://schemas.openxmlformats.org/presentationml/2006/main" showMasterSp="0" showMasterPhAnim="0">
+  <p:cSld>
+    <p:spTree>
+      <p:nvGrpSpPr>
+        <p:cNvPr id="1" name="Shape 848"/>
+        <p:cNvGrpSpPr/>
+        <p:nvPr/>
+      </p:nvGrpSpPr>
+      <p:grpSpPr>
+        <a:xfrm>
+          <a:off x="0" y="0"/>
+          <a:ext cx="0" cy="0"/>
+          <a:chOff x="0" y="0"/>
+          <a:chExt cx="0" cy="0"/>
+        </a:xfrm>
+      </p:grpSpPr>
+      <p:sp>
+        <p:nvSpPr>
+          <p:cNvPr id="849" name="Google Shape;849;ge7f9c668d6_0_1028:notes"/>
+          <p:cNvSpPr>
+            <a:spLocks noGrp="1" noRot="1" noChangeAspect="1"/>
+          </p:cNvSpPr>
+          <p:nvPr>
+            <p:ph type="sldImg" idx="2"/>
+          </p:nvPr>
+        </p:nvSpPr>
+        <p:spPr>
+          <a:xfrm>
+            <a:off x="381000" y="685800"/>
+            <a:ext cx="6096000" cy="3429000"/>
+          </a:xfrm>
+          <a:custGeom>
+            <a:avLst/>
+            <a:gdLst/>
+            <a:ahLst/>
+            <a:cxnLst/>
+            <a:rect l="l" t="t" r="r" b="b"/>
+            <a:pathLst>
+              <a:path w="120000" h="120000" extrusionOk="0">
+                <a:moveTo>
+                  <a:pt x="0" y="0"/>
+                </a:moveTo>
+                <a:lnTo>
+                  <a:pt x="120000" y="0"/>
+                </a:lnTo>
+                <a:lnTo>
+                  <a:pt x="120000" y="120000"/>
+                </a:lnTo>
+                <a:lnTo>
+                  <a:pt x="0" y="120000"/>
+                </a:lnTo>
+                <a:close/>
+              </a:path>
+            </a:pathLst>
+          </a:custGeom>
+        </p:spPr>
+      </p:sp>
+      <p:sp>
+        <p:nvSpPr>
           <p:cNvPr id="850" name="Google Shape;850;ge7f9c668d6_0_1028:notes"/>
           <p:cNvSpPr txBox="1">
             <a:spLocks noGrp="1"/>
@@ -1235,7 +1346,116 @@
     </p:spTree>
     <p:extLst>
       <p:ext uri="{BB962C8B-B14F-4D97-AF65-F5344CB8AC3E}">
-        <p14:creationId xmlns:p14="http://schemas.microsoft.com/office/powerpoint/2010/main" val="2768772137"/>
+        <p14:creationId xmlns:p14="http://schemas.microsoft.com/office/powerpoint/2010/main" val="2449451923"/>
+      </p:ext>
+    </p:extLst>
+  </p:cSld>
+  <p:clrMapOvr>
+    <a:masterClrMapping/>
+  </p:clrMapOvr>
+</p:notes>
+</file>
+
+<file path=ppt/notesSlides/notesSlide15.xml><?xml version="1.0" encoding="utf-8"?>
+<p:notes xmlns:a="http://schemas.openxmlformats.org/drawingml/2006/main" xmlns:r="http://schemas.openxmlformats.org/officeDocument/2006/relationships" xmlns:p="http://schemas.openxmlformats.org/presentationml/2006/main" showMasterSp="0" showMasterPhAnim="0">
+  <p:cSld>
+    <p:spTree>
+      <p:nvGrpSpPr>
+        <p:cNvPr id="1" name="Shape 496"/>
+        <p:cNvGrpSpPr/>
+        <p:nvPr/>
+      </p:nvGrpSpPr>
+      <p:grpSpPr>
+        <a:xfrm>
+          <a:off x="0" y="0"/>
+          <a:ext cx="0" cy="0"/>
+          <a:chOff x="0" y="0"/>
+          <a:chExt cx="0" cy="0"/>
+        </a:xfrm>
+      </p:grpSpPr>
+      <p:sp>
+        <p:nvSpPr>
+          <p:cNvPr id="497" name="Google Shape;497;ge7f9c668d6_0_6:notes"/>
+          <p:cNvSpPr>
+            <a:spLocks noGrp="1" noRot="1" noChangeAspect="1"/>
+          </p:cNvSpPr>
+          <p:nvPr>
+            <p:ph type="sldImg" idx="2"/>
+          </p:nvPr>
+        </p:nvSpPr>
+        <p:spPr>
+          <a:xfrm>
+            <a:off x="381000" y="685800"/>
+            <a:ext cx="6096000" cy="3429000"/>
+          </a:xfrm>
+          <a:custGeom>
+            <a:avLst/>
+            <a:gdLst/>
+            <a:ahLst/>
+            <a:cxnLst/>
+            <a:rect l="l" t="t" r="r" b="b"/>
+            <a:pathLst>
+              <a:path w="120000" h="120000" extrusionOk="0">
+                <a:moveTo>
+                  <a:pt x="0" y="0"/>
+                </a:moveTo>
+                <a:lnTo>
+                  <a:pt x="120000" y="0"/>
+                </a:lnTo>
+                <a:lnTo>
+                  <a:pt x="120000" y="120000"/>
+                </a:lnTo>
+                <a:lnTo>
+                  <a:pt x="0" y="120000"/>
+                </a:lnTo>
+                <a:close/>
+              </a:path>
+            </a:pathLst>
+          </a:custGeom>
+        </p:spPr>
+      </p:sp>
+      <p:sp>
+        <p:nvSpPr>
+          <p:cNvPr id="498" name="Google Shape;498;ge7f9c668d6_0_6:notes"/>
+          <p:cNvSpPr txBox="1">
+            <a:spLocks noGrp="1"/>
+          </p:cNvSpPr>
+          <p:nvPr>
+            <p:ph type="body" idx="1"/>
+          </p:nvPr>
+        </p:nvSpPr>
+        <p:spPr>
+          <a:xfrm>
+            <a:off x="685800" y="4343400"/>
+            <a:ext cx="5486400" cy="4114800"/>
+          </a:xfrm>
+          <a:prstGeom prst="rect">
+            <a:avLst/>
+          </a:prstGeom>
+        </p:spPr>
+        <p:txBody>
+          <a:bodyPr spcFirstLastPara="1" wrap="square" lIns="91425" tIns="91425" rIns="91425" bIns="91425" anchor="t" anchorCtr="0">
+            <a:noAutofit/>
+          </a:bodyPr>
+          <a:lstStyle/>
+          <a:p>
+            <a:pPr marL="0" lvl="0" indent="0" algn="l" rtl="0">
+              <a:spcBef>
+                <a:spcPts val="0"/>
+              </a:spcBef>
+              <a:spcAft>
+                <a:spcPts val="0"/>
+              </a:spcAft>
+              <a:buNone/>
+            </a:pPr>
+            <a:endParaRPr/>
+          </a:p>
+        </p:txBody>
+      </p:sp>
+    </p:spTree>
+    <p:extLst>
+      <p:ext uri="{BB962C8B-B14F-4D97-AF65-F5344CB8AC3E}">
+        <p14:creationId xmlns:p14="http://schemas.microsoft.com/office/powerpoint/2010/main" val="73529"/>
       </p:ext>
     </p:extLst>
   </p:cSld>
@@ -18732,7 +18952,7 @@
   <p:cSld>
     <p:spTree>
       <p:nvGrpSpPr>
-        <p:cNvPr id="1" name="Shape 851"/>
+        <p:cNvPr id="1" name="Shape 499"/>
         <p:cNvGrpSpPr/>
         <p:nvPr/>
       </p:nvGrpSpPr>
@@ -18746,73 +18966,7 @@
       </p:grpSpPr>
       <p:sp>
         <p:nvSpPr>
-          <p:cNvPr id="852" name="Google Shape;852;p42"/>
-          <p:cNvSpPr txBox="1">
-            <a:spLocks noGrp="1"/>
-          </p:cNvSpPr>
-          <p:nvPr>
-            <p:ph type="title"/>
-          </p:nvPr>
-        </p:nvSpPr>
-        <p:spPr>
-          <a:xfrm>
-            <a:off x="1157725" y="843494"/>
-            <a:ext cx="5306870" cy="1423500"/>
-          </a:xfrm>
-          <a:prstGeom prst="rect">
-            <a:avLst/>
-          </a:prstGeom>
-        </p:spPr>
-        <p:txBody>
-          <a:bodyPr spcFirstLastPara="1" wrap="square" lIns="91425" tIns="91425" rIns="91425" bIns="91425" anchor="t" anchorCtr="0">
-            <a:noAutofit/>
-          </a:bodyPr>
-          <a:lstStyle/>
-          <a:p>
-            <a:pPr marL="0" lvl="0" indent="0" algn="l" rtl="0">
-              <a:spcBef>
-                <a:spcPts val="0"/>
-              </a:spcBef>
-              <a:spcAft>
-                <a:spcPts val="0"/>
-              </a:spcAft>
-              <a:buNone/>
-            </a:pPr>
-            <a:r>
-              <a:rPr lang="en" dirty="0">
-                <a:solidFill>
-                  <a:schemeClr val="lt1"/>
-                </a:solidFill>
-              </a:rPr>
-              <a:t>Kelas</a:t>
-            </a:r>
-            <a:r>
-              <a:rPr lang="en" dirty="0">
-                <a:solidFill>
-                  <a:schemeClr val="accent2"/>
-                </a:solidFill>
-              </a:rPr>
-              <a:t> ‘BankAccount’ </a:t>
-            </a:r>
-            <a:r>
-              <a:rPr lang="en" dirty="0">
-                <a:solidFill>
-                  <a:schemeClr val="accent6"/>
-                </a:solidFill>
-              </a:rPr>
-              <a:t>{</a:t>
-            </a:r>
-            <a:endParaRPr dirty="0">
-              <a:solidFill>
-                <a:schemeClr val="accent6"/>
-              </a:solidFill>
-            </a:endParaRPr>
-          </a:p>
-        </p:txBody>
-      </p:sp>
-      <p:sp>
-        <p:nvSpPr>
-          <p:cNvPr id="854" name="Google Shape;854;p42"/>
+          <p:cNvPr id="505" name="Google Shape;505;p30"/>
           <p:cNvSpPr txBox="1">
             <a:spLocks noGrp="1"/>
           </p:cNvSpPr>
@@ -18862,7 +19016,7 @@
       </p:sp>
       <p:sp>
         <p:nvSpPr>
-          <p:cNvPr id="855" name="Google Shape;855;p42"/>
+          <p:cNvPr id="506" name="Google Shape;506;p30"/>
           <p:cNvSpPr txBox="1">
             <a:spLocks noGrp="1"/>
           </p:cNvSpPr>
@@ -18912,7 +19066,7 @@
       </p:sp>
       <p:sp>
         <p:nvSpPr>
-          <p:cNvPr id="856" name="Google Shape;856;p42"/>
+          <p:cNvPr id="507" name="Google Shape;507;p30"/>
           <p:cNvSpPr txBox="1">
             <a:spLocks noGrp="1"/>
           </p:cNvSpPr>
@@ -18960,111 +19114,12 @@
           </a:p>
         </p:txBody>
       </p:sp>
-      <p:grpSp>
-        <p:nvGrpSpPr>
-          <p:cNvPr id="858" name="Google Shape;858;p42"/>
-          <p:cNvGrpSpPr/>
-          <p:nvPr/>
-        </p:nvGrpSpPr>
-        <p:grpSpPr>
-          <a:xfrm>
-            <a:off x="1084825" y="1679944"/>
-            <a:ext cx="506100" cy="2890081"/>
-            <a:chOff x="1084825" y="2556550"/>
-            <a:chExt cx="506100" cy="2013475"/>
-          </a:xfrm>
-        </p:grpSpPr>
-        <p:sp>
-          <p:nvSpPr>
-            <p:cNvPr id="859" name="Google Shape;859;p42"/>
-            <p:cNvSpPr txBox="1"/>
-            <p:nvPr/>
-          </p:nvSpPr>
-          <p:spPr>
-            <a:xfrm>
-              <a:off x="1084825" y="3954425"/>
-              <a:ext cx="506100" cy="615600"/>
-            </a:xfrm>
-            <a:prstGeom prst="rect">
-              <a:avLst/>
-            </a:prstGeom>
-            <a:noFill/>
-            <a:ln>
-              <a:noFill/>
-            </a:ln>
-          </p:spPr>
-          <p:txBody>
-            <a:bodyPr spcFirstLastPara="1" wrap="square" lIns="91425" tIns="91425" rIns="91425" bIns="91425" anchor="t" anchorCtr="0">
-              <a:spAutoFit/>
-            </a:bodyPr>
-            <a:lstStyle/>
-            <a:p>
-              <a:pPr marL="0" lvl="0" indent="0" algn="ctr" rtl="0">
-                <a:spcBef>
-                  <a:spcPts val="0"/>
-                </a:spcBef>
-                <a:spcAft>
-                  <a:spcPts val="0"/>
-                </a:spcAft>
-                <a:buNone/>
-              </a:pPr>
-              <a:r>
-                <a:rPr lang="en" sz="2800">
-                  <a:solidFill>
-                    <a:schemeClr val="accent6"/>
-                  </a:solidFill>
-                  <a:latin typeface="Fira Code"/>
-                  <a:ea typeface="Fira Code"/>
-                  <a:cs typeface="Fira Code"/>
-                  <a:sym typeface="Fira Code"/>
-                </a:rPr>
-                <a:t>}</a:t>
-              </a:r>
-              <a:endParaRPr sz="2800">
-                <a:solidFill>
-                  <a:schemeClr val="accent6"/>
-                </a:solidFill>
-                <a:latin typeface="Fira Code"/>
-                <a:ea typeface="Fira Code"/>
-                <a:cs typeface="Fira Code"/>
-                <a:sym typeface="Fira Code"/>
-              </a:endParaRPr>
-            </a:p>
-          </p:txBody>
-        </p:sp>
-        <p:cxnSp>
-          <p:nvCxnSpPr>
-            <p:cNvPr id="860" name="Google Shape;860;p42"/>
-            <p:cNvCxnSpPr/>
-            <p:nvPr/>
-          </p:nvCxnSpPr>
-          <p:spPr>
-            <a:xfrm>
-              <a:off x="1337875" y="2556550"/>
-              <a:ext cx="0" cy="1377000"/>
-            </a:xfrm>
-            <a:prstGeom prst="straightConnector1">
-              <a:avLst/>
-            </a:prstGeom>
-            <a:noFill/>
-            <a:ln w="9525" cap="flat" cmpd="sng">
-              <a:solidFill>
-                <a:schemeClr val="accent4"/>
-              </a:solidFill>
-              <a:prstDash val="solid"/>
-              <a:round/>
-              <a:headEnd type="none" w="med" len="med"/>
-              <a:tailEnd type="none" w="med" len="med"/>
-            </a:ln>
-          </p:spPr>
-        </p:cxnSp>
-      </p:grpSp>
       <p:pic>
         <p:nvPicPr>
-          <p:cNvPr id="3" name="Picture 2">
+          <p:cNvPr id="7" name="Picture 6">
             <a:extLst>
               <a:ext uri="{FF2B5EF4-FFF2-40B4-BE49-F238E27FC236}">
-                <a16:creationId xmlns:a16="http://schemas.microsoft.com/office/drawing/2014/main" id="{6A7980A3-457C-312C-E899-D76E60BCC3D7}"/>
+                <a16:creationId xmlns:a16="http://schemas.microsoft.com/office/drawing/2014/main" id="{B15ABC3D-24A5-28C9-DEDB-C5D6A56A2BEB}"/>
               </a:ext>
             </a:extLst>
           </p:cNvPr>
@@ -19081,8 +19136,8 @@
         </p:blipFill>
         <p:spPr>
           <a:xfrm>
-            <a:off x="1590925" y="1727118"/>
-            <a:ext cx="6806618" cy="1423500"/>
+            <a:off x="2133475" y="772606"/>
+            <a:ext cx="4865100" cy="3598287"/>
           </a:xfrm>
           <a:prstGeom prst="rect">
             <a:avLst/>
@@ -19092,7 +19147,7 @@
     </p:spTree>
     <p:extLst>
       <p:ext uri="{BB962C8B-B14F-4D97-AF65-F5344CB8AC3E}">
-        <p14:creationId xmlns:p14="http://schemas.microsoft.com/office/powerpoint/2010/main" val="202751649"/>
+        <p14:creationId xmlns:p14="http://schemas.microsoft.com/office/powerpoint/2010/main" val="460811870"/>
       </p:ext>
     </p:extLst>
   </p:cSld>
@@ -19103,6 +19158,426 @@
 </file>
 
 <file path=ppt/slides/slide14.xml><?xml version="1.0" encoding="utf-8"?>
+<p:sld xmlns:a="http://schemas.openxmlformats.org/drawingml/2006/main" xmlns:r="http://schemas.openxmlformats.org/officeDocument/2006/relationships" xmlns:p="http://schemas.openxmlformats.org/presentationml/2006/main">
+  <p:cSld>
+    <p:spTree>
+      <p:nvGrpSpPr>
+        <p:cNvPr id="1" name="Shape 851"/>
+        <p:cNvGrpSpPr/>
+        <p:nvPr/>
+      </p:nvGrpSpPr>
+      <p:grpSpPr>
+        <a:xfrm>
+          <a:off x="0" y="0"/>
+          <a:ext cx="0" cy="0"/>
+          <a:chOff x="0" y="0"/>
+          <a:chExt cx="0" cy="0"/>
+        </a:xfrm>
+      </p:grpSpPr>
+      <p:sp>
+        <p:nvSpPr>
+          <p:cNvPr id="854" name="Google Shape;854;p42"/>
+          <p:cNvSpPr txBox="1">
+            <a:spLocks noGrp="1"/>
+          </p:cNvSpPr>
+          <p:nvPr>
+            <p:ph type="subTitle" idx="4294967295"/>
+          </p:nvPr>
+        </p:nvSpPr>
+        <p:spPr>
+          <a:xfrm>
+            <a:off x="710125" y="4694725"/>
+            <a:ext cx="4865100" cy="357300"/>
+          </a:xfrm>
+          <a:prstGeom prst="rect">
+            <a:avLst/>
+          </a:prstGeom>
+        </p:spPr>
+        <p:txBody>
+          <a:bodyPr spcFirstLastPara="1" wrap="square" lIns="91425" tIns="91425" rIns="91425" bIns="91425" anchor="ctr" anchorCtr="0">
+            <a:noAutofit/>
+          </a:bodyPr>
+          <a:lstStyle/>
+          <a:p>
+            <a:pPr marL="0" lvl="0" indent="0" algn="l" rtl="0">
+              <a:spcBef>
+                <a:spcPts val="0"/>
+              </a:spcBef>
+              <a:spcAft>
+                <a:spcPts val="0"/>
+              </a:spcAft>
+              <a:buNone/>
+            </a:pPr>
+            <a:r>
+              <a:rPr lang="id-ID" sz="1400" dirty="0">
+                <a:solidFill>
+                  <a:schemeClr val="accent3"/>
+                </a:solidFill>
+              </a:rPr>
+              <a:t>Unit Testing</a:t>
+            </a:r>
+            <a:endParaRPr sz="1400" dirty="0">
+              <a:solidFill>
+                <a:schemeClr val="accent3"/>
+              </a:solidFill>
+            </a:endParaRPr>
+          </a:p>
+        </p:txBody>
+      </p:sp>
+      <p:sp>
+        <p:nvSpPr>
+          <p:cNvPr id="855" name="Google Shape;855;p42"/>
+          <p:cNvSpPr txBox="1">
+            <a:spLocks noGrp="1"/>
+          </p:cNvSpPr>
+          <p:nvPr>
+            <p:ph type="subTitle" idx="4294967295"/>
+          </p:nvPr>
+        </p:nvSpPr>
+        <p:spPr>
+          <a:xfrm>
+            <a:off x="-5975" y="91525"/>
+            <a:ext cx="4572000" cy="357300"/>
+          </a:xfrm>
+          <a:prstGeom prst="rect">
+            <a:avLst/>
+          </a:prstGeom>
+        </p:spPr>
+        <p:txBody>
+          <a:bodyPr spcFirstLastPara="1" wrap="square" lIns="91425" tIns="91425" rIns="91425" bIns="91425" anchor="ctr" anchorCtr="0">
+            <a:noAutofit/>
+          </a:bodyPr>
+          <a:lstStyle/>
+          <a:p>
+            <a:pPr marL="0" lvl="0" indent="0" algn="ctr" rtl="0">
+              <a:spcBef>
+                <a:spcPts val="0"/>
+              </a:spcBef>
+              <a:spcAft>
+                <a:spcPts val="0"/>
+              </a:spcAft>
+              <a:buNone/>
+            </a:pPr>
+            <a:r>
+              <a:rPr lang="id-ID" sz="1400" dirty="0">
+                <a:solidFill>
+                  <a:schemeClr val="accent3"/>
+                </a:solidFill>
+              </a:rPr>
+              <a:t>Class.java</a:t>
+            </a:r>
+            <a:endParaRPr sz="1400" dirty="0">
+              <a:solidFill>
+                <a:schemeClr val="accent3"/>
+              </a:solidFill>
+            </a:endParaRPr>
+          </a:p>
+        </p:txBody>
+      </p:sp>
+      <p:sp>
+        <p:nvSpPr>
+          <p:cNvPr id="856" name="Google Shape;856;p42"/>
+          <p:cNvSpPr txBox="1">
+            <a:spLocks noGrp="1"/>
+          </p:cNvSpPr>
+          <p:nvPr>
+            <p:ph type="subTitle" idx="4294967295"/>
+          </p:nvPr>
+        </p:nvSpPr>
+        <p:spPr>
+          <a:xfrm>
+            <a:off x="4572000" y="91525"/>
+            <a:ext cx="4572000" cy="357300"/>
+          </a:xfrm>
+          <a:prstGeom prst="rect">
+            <a:avLst/>
+          </a:prstGeom>
+        </p:spPr>
+        <p:txBody>
+          <a:bodyPr spcFirstLastPara="1" wrap="square" lIns="91425" tIns="91425" rIns="91425" bIns="91425" anchor="ctr" anchorCtr="0">
+            <a:noAutofit/>
+          </a:bodyPr>
+          <a:lstStyle/>
+          <a:p>
+            <a:pPr marL="0" lvl="0" indent="0" algn="ctr" rtl="0">
+              <a:spcBef>
+                <a:spcPts val="0"/>
+              </a:spcBef>
+              <a:spcAft>
+                <a:spcPts val="0"/>
+              </a:spcAft>
+              <a:buNone/>
+            </a:pPr>
+            <a:r>
+              <a:rPr lang="id-ID" sz="1400" dirty="0">
+                <a:solidFill>
+                  <a:schemeClr val="accent3"/>
+                </a:solidFill>
+              </a:rPr>
+              <a:t>ClassTest.java</a:t>
+            </a:r>
+            <a:endParaRPr sz="1400" dirty="0">
+              <a:solidFill>
+                <a:schemeClr val="accent3"/>
+              </a:solidFill>
+            </a:endParaRPr>
+          </a:p>
+        </p:txBody>
+      </p:sp>
+      <p:pic>
+        <p:nvPicPr>
+          <p:cNvPr id="5" name="Picture 4">
+            <a:extLst>
+              <a:ext uri="{FF2B5EF4-FFF2-40B4-BE49-F238E27FC236}">
+                <a16:creationId xmlns:a16="http://schemas.microsoft.com/office/drawing/2014/main" id="{0ACD2049-1A53-9E4E-BC83-FFE8F2689515}"/>
+              </a:ext>
+            </a:extLst>
+          </p:cNvPr>
+          <p:cNvPicPr>
+            <a:picLocks noChangeAspect="1"/>
+          </p:cNvPicPr>
+          <p:nvPr/>
+        </p:nvPicPr>
+        <p:blipFill>
+          <a:blip r:embed="rId3"/>
+          <a:stretch>
+            <a:fillRect/>
+          </a:stretch>
+        </p:blipFill>
+        <p:spPr>
+          <a:xfrm>
+            <a:off x="1117493" y="1336618"/>
+            <a:ext cx="7659215" cy="1491642"/>
+          </a:xfrm>
+          <a:prstGeom prst="rect">
+            <a:avLst/>
+          </a:prstGeom>
+        </p:spPr>
+      </p:pic>
+    </p:spTree>
+    <p:extLst>
+      <p:ext uri="{BB962C8B-B14F-4D97-AF65-F5344CB8AC3E}">
+        <p14:creationId xmlns:p14="http://schemas.microsoft.com/office/powerpoint/2010/main" val="3539164413"/>
+      </p:ext>
+    </p:extLst>
+  </p:cSld>
+  <p:clrMapOvr>
+    <a:masterClrMapping/>
+  </p:clrMapOvr>
+</p:sld>
+</file>
+
+<file path=ppt/slides/slide15.xml><?xml version="1.0" encoding="utf-8"?>
+<p:sld xmlns:a="http://schemas.openxmlformats.org/drawingml/2006/main" xmlns:r="http://schemas.openxmlformats.org/officeDocument/2006/relationships" xmlns:p="http://schemas.openxmlformats.org/presentationml/2006/main">
+  <p:cSld>
+    <p:spTree>
+      <p:nvGrpSpPr>
+        <p:cNvPr id="1" name="Shape 499"/>
+        <p:cNvGrpSpPr/>
+        <p:nvPr/>
+      </p:nvGrpSpPr>
+      <p:grpSpPr>
+        <a:xfrm>
+          <a:off x="0" y="0"/>
+          <a:ext cx="0" cy="0"/>
+          <a:chOff x="0" y="0"/>
+          <a:chExt cx="0" cy="0"/>
+        </a:xfrm>
+      </p:grpSpPr>
+      <p:sp>
+        <p:nvSpPr>
+          <p:cNvPr id="505" name="Google Shape;505;p30"/>
+          <p:cNvSpPr txBox="1">
+            <a:spLocks noGrp="1"/>
+          </p:cNvSpPr>
+          <p:nvPr>
+            <p:ph type="subTitle" idx="4294967295"/>
+          </p:nvPr>
+        </p:nvSpPr>
+        <p:spPr>
+          <a:xfrm>
+            <a:off x="710125" y="4694725"/>
+            <a:ext cx="4865100" cy="357300"/>
+          </a:xfrm>
+          <a:prstGeom prst="rect">
+            <a:avLst/>
+          </a:prstGeom>
+        </p:spPr>
+        <p:txBody>
+          <a:bodyPr spcFirstLastPara="1" wrap="square" lIns="91425" tIns="91425" rIns="91425" bIns="91425" anchor="ctr" anchorCtr="0">
+            <a:noAutofit/>
+          </a:bodyPr>
+          <a:lstStyle/>
+          <a:p>
+            <a:pPr marL="0" lvl="0" indent="0" algn="l" rtl="0">
+              <a:spcBef>
+                <a:spcPts val="0"/>
+              </a:spcBef>
+              <a:spcAft>
+                <a:spcPts val="0"/>
+              </a:spcAft>
+              <a:buNone/>
+            </a:pPr>
+            <a:r>
+              <a:rPr lang="id-ID" sz="1400" dirty="0">
+                <a:solidFill>
+                  <a:schemeClr val="accent3"/>
+                </a:solidFill>
+              </a:rPr>
+              <a:t>Unit Testing</a:t>
+            </a:r>
+            <a:endParaRPr sz="1400" dirty="0">
+              <a:solidFill>
+                <a:schemeClr val="accent3"/>
+              </a:solidFill>
+            </a:endParaRPr>
+          </a:p>
+        </p:txBody>
+      </p:sp>
+      <p:sp>
+        <p:nvSpPr>
+          <p:cNvPr id="506" name="Google Shape;506;p30"/>
+          <p:cNvSpPr txBox="1">
+            <a:spLocks noGrp="1"/>
+          </p:cNvSpPr>
+          <p:nvPr>
+            <p:ph type="subTitle" idx="4294967295"/>
+          </p:nvPr>
+        </p:nvSpPr>
+        <p:spPr>
+          <a:xfrm>
+            <a:off x="-5975" y="91525"/>
+            <a:ext cx="4572000" cy="357300"/>
+          </a:xfrm>
+          <a:prstGeom prst="rect">
+            <a:avLst/>
+          </a:prstGeom>
+        </p:spPr>
+        <p:txBody>
+          <a:bodyPr spcFirstLastPara="1" wrap="square" lIns="91425" tIns="91425" rIns="91425" bIns="91425" anchor="ctr" anchorCtr="0">
+            <a:noAutofit/>
+          </a:bodyPr>
+          <a:lstStyle/>
+          <a:p>
+            <a:pPr marL="0" lvl="0" indent="0" algn="ctr" rtl="0">
+              <a:spcBef>
+                <a:spcPts val="0"/>
+              </a:spcBef>
+              <a:spcAft>
+                <a:spcPts val="0"/>
+              </a:spcAft>
+              <a:buNone/>
+            </a:pPr>
+            <a:r>
+              <a:rPr lang="id-ID" sz="1400" dirty="0">
+                <a:solidFill>
+                  <a:schemeClr val="accent3"/>
+                </a:solidFill>
+              </a:rPr>
+              <a:t>Class.java</a:t>
+            </a:r>
+            <a:endParaRPr sz="1400" dirty="0">
+              <a:solidFill>
+                <a:schemeClr val="accent3"/>
+              </a:solidFill>
+            </a:endParaRPr>
+          </a:p>
+        </p:txBody>
+      </p:sp>
+      <p:sp>
+        <p:nvSpPr>
+          <p:cNvPr id="507" name="Google Shape;507;p30"/>
+          <p:cNvSpPr txBox="1">
+            <a:spLocks noGrp="1"/>
+          </p:cNvSpPr>
+          <p:nvPr>
+            <p:ph type="subTitle" idx="4294967295"/>
+          </p:nvPr>
+        </p:nvSpPr>
+        <p:spPr>
+          <a:xfrm>
+            <a:off x="4572000" y="91525"/>
+            <a:ext cx="4572000" cy="357300"/>
+          </a:xfrm>
+          <a:prstGeom prst="rect">
+            <a:avLst/>
+          </a:prstGeom>
+        </p:spPr>
+        <p:txBody>
+          <a:bodyPr spcFirstLastPara="1" wrap="square" lIns="91425" tIns="91425" rIns="91425" bIns="91425" anchor="ctr" anchorCtr="0">
+            <a:noAutofit/>
+          </a:bodyPr>
+          <a:lstStyle/>
+          <a:p>
+            <a:pPr marL="0" lvl="0" indent="0" algn="ctr" rtl="0">
+              <a:spcBef>
+                <a:spcPts val="0"/>
+              </a:spcBef>
+              <a:spcAft>
+                <a:spcPts val="0"/>
+              </a:spcAft>
+              <a:buNone/>
+            </a:pPr>
+            <a:r>
+              <a:rPr lang="id-ID" sz="1400" dirty="0">
+                <a:solidFill>
+                  <a:schemeClr val="accent3"/>
+                </a:solidFill>
+              </a:rPr>
+              <a:t>ClassTest.java</a:t>
+            </a:r>
+            <a:endParaRPr sz="1400" dirty="0">
+              <a:solidFill>
+                <a:schemeClr val="accent3"/>
+              </a:solidFill>
+            </a:endParaRPr>
+          </a:p>
+        </p:txBody>
+      </p:sp>
+      <p:pic>
+        <p:nvPicPr>
+          <p:cNvPr id="3" name="Picture 2">
+            <a:extLst>
+              <a:ext uri="{FF2B5EF4-FFF2-40B4-BE49-F238E27FC236}">
+                <a16:creationId xmlns:a16="http://schemas.microsoft.com/office/drawing/2014/main" id="{9373FC37-50EF-9639-394C-EFF620208181}"/>
+              </a:ext>
+            </a:extLst>
+          </p:cNvPr>
+          <p:cNvPicPr>
+            <a:picLocks noChangeAspect="1"/>
+          </p:cNvPicPr>
+          <p:nvPr/>
+        </p:nvPicPr>
+        <p:blipFill>
+          <a:blip r:embed="rId3"/>
+          <a:stretch>
+            <a:fillRect/>
+          </a:stretch>
+        </p:blipFill>
+        <p:spPr>
+          <a:xfrm>
+            <a:off x="1271959" y="1049721"/>
+            <a:ext cx="7545480" cy="2469656"/>
+          </a:xfrm>
+          <a:prstGeom prst="rect">
+            <a:avLst/>
+          </a:prstGeom>
+        </p:spPr>
+      </p:pic>
+    </p:spTree>
+    <p:extLst>
+      <p:ext uri="{BB962C8B-B14F-4D97-AF65-F5344CB8AC3E}">
+        <p14:creationId xmlns:p14="http://schemas.microsoft.com/office/powerpoint/2010/main" val="296634161"/>
+      </p:ext>
+    </p:extLst>
+  </p:cSld>
+  <p:clrMapOvr>
+    <a:masterClrMapping/>
+  </p:clrMapOvr>
+</p:sld>
+</file>
+
+<file path=ppt/slides/slide16.xml><?xml version="1.0" encoding="utf-8"?>
 <p:sld xmlns:a="http://schemas.openxmlformats.org/drawingml/2006/main" xmlns:r="http://schemas.openxmlformats.org/officeDocument/2006/relationships" xmlns:p="http://schemas.openxmlformats.org/presentationml/2006/main">
   <p:cSld>
     <p:spTree>

</xml_diff>